<commit_message>
presentation: add stiffness and damping in the table
</commit_message>
<xml_diff>
--- a/SimScienceAB_Presentation.pptx
+++ b/SimScienceAB_Presentation.pptx
@@ -107,6 +107,11 @@
       </a:defRPr>
     </a:lvl9pPr>
   </p:defaultTextStyle>
+  <p:extLst>
+    <p:ext uri="{EFAFB233-063F-42B5-8137-9DF3F51BA10A}">
+      <p15:sldGuideLst xmlns:p15="http://schemas.microsoft.com/office/powerpoint/2012/main"/>
+    </p:ext>
+  </p:extLst>
 </p:presentation>
 </file>
 
@@ -3392,8 +3397,8 @@
           </a:p>
         </p:txBody>
       </p:sp>
-      <mc:AlternateContent xmlns:mc="http://schemas.openxmlformats.org/markup-compatibility/2006">
-        <mc:Choice xmlns:a14="http://schemas.microsoft.com/office/drawing/2010/main" Requires="a14">
+      <mc:AlternateContent xmlns:mc="http://schemas.openxmlformats.org/markup-compatibility/2006" xmlns:a14="http://schemas.microsoft.com/office/drawing/2010/main">
+        <mc:Choice Requires="a14">
           <p:sp>
             <p:nvSpPr>
               <p:cNvPr id="58" name="TextBox 57">
@@ -3422,6 +3427,7 @@
               </a:bodyPr>
               <a:lstStyle/>
               <a:p>
+                <a:pPr/>
                 <a14:m>
                   <m:oMathPara xmlns:m="http://schemas.openxmlformats.org/officeDocument/2006/math">
                     <m:oMathParaPr>
@@ -3567,7 +3573,7 @@
             </p:txBody>
           </p:sp>
         </mc:Choice>
-        <mc:Fallback>
+        <mc:Fallback xmlns="">
           <p:sp>
             <p:nvSpPr>
               <p:cNvPr id="58" name="TextBox 57">
@@ -3612,8 +3618,8 @@
           </p:sp>
         </mc:Fallback>
       </mc:AlternateContent>
-      <mc:AlternateContent xmlns:mc="http://schemas.openxmlformats.org/markup-compatibility/2006">
-        <mc:Choice xmlns:a14="http://schemas.microsoft.com/office/drawing/2010/main" Requires="a14">
+      <mc:AlternateContent xmlns:mc="http://schemas.openxmlformats.org/markup-compatibility/2006" xmlns:a14="http://schemas.microsoft.com/office/drawing/2010/main">
+        <mc:Choice Requires="a14">
           <p:sp>
             <p:nvSpPr>
               <p:cNvPr id="60" name="TextBox 59">
@@ -3642,7 +3648,6 @@
               </a:bodyPr>
               <a:lstStyle/>
               <a:p>
-                <a:pPr/>
                 <a14:m>
                   <m:oMath xmlns:m="http://schemas.openxmlformats.org/officeDocument/2006/math">
                     <m:sSubSup>
@@ -3687,7 +3692,7 @@
             </p:txBody>
           </p:sp>
         </mc:Choice>
-        <mc:Fallback>
+        <mc:Fallback xmlns="">
           <p:sp>
             <p:nvSpPr>
               <p:cNvPr id="60" name="TextBox 59">
@@ -3930,8 +3935,8 @@
           </a:prstGeom>
         </p:spPr>
       </p:pic>
-      <mc:AlternateContent xmlns:mc="http://schemas.openxmlformats.org/markup-compatibility/2006">
-        <mc:Choice xmlns:a14="http://schemas.microsoft.com/office/drawing/2010/main" Requires="a14">
+      <mc:AlternateContent xmlns:mc="http://schemas.openxmlformats.org/markup-compatibility/2006" xmlns:a14="http://schemas.microsoft.com/office/drawing/2010/main">
+        <mc:Choice Requires="a14">
           <p:graphicFrame>
             <p:nvGraphicFramePr>
               <p:cNvPr id="108" name="Table 55">
@@ -4784,7 +4789,7 @@
             </a:graphic>
           </p:graphicFrame>
         </mc:Choice>
-        <mc:Fallback>
+        <mc:Fallback xmlns="">
           <p:graphicFrame>
             <p:nvGraphicFramePr>
               <p:cNvPr id="108" name="Table 55">
@@ -5598,8 +5603,8 @@
           <a:chExt cx="0" cy="0"/>
         </a:xfrm>
       </p:grpSpPr>
-      <mc:AlternateContent xmlns:mc="http://schemas.openxmlformats.org/markup-compatibility/2006">
-        <mc:Choice xmlns:a14="http://schemas.microsoft.com/office/drawing/2010/main" Requires="a14">
+      <mc:AlternateContent xmlns:mc="http://schemas.openxmlformats.org/markup-compatibility/2006" xmlns:a14="http://schemas.microsoft.com/office/drawing/2010/main">
+        <mc:Choice Requires="a14">
           <p:graphicFrame>
             <p:nvGraphicFramePr>
               <p:cNvPr id="6" name="Table 55">
@@ -6452,7 +6457,7 @@
             </a:graphic>
           </p:graphicFrame>
         </mc:Choice>
-        <mc:Fallback>
+        <mc:Fallback xmlns="">
           <p:graphicFrame>
             <p:nvGraphicFramePr>
               <p:cNvPr id="6" name="Table 55">
@@ -7253,14 +7258,14 @@
               <p:nvPr>
                 <p:extLst>
                   <p:ext uri="{D42A27DB-BD31-4B8C-83A1-F6EECF244321}">
-                    <p14:modId xmlns:p14="http://schemas.microsoft.com/office/powerpoint/2010/main" val="3480575101"/>
+                    <p14:modId xmlns:p14="http://schemas.microsoft.com/office/powerpoint/2010/main" val="1221710503"/>
                   </p:ext>
                 </p:extLst>
               </p:nvPr>
             </p:nvGraphicFramePr>
             <p:xfrm>
-              <a:off x="5621481" y="3429000"/>
-              <a:ext cx="6471327" cy="3067681"/>
+              <a:off x="5621481" y="3002781"/>
+              <a:ext cx="6471327" cy="3738241"/>
             </p:xfrm>
             <a:graphic>
               <a:graphicData uri="http://schemas.openxmlformats.org/drawingml/2006/table">
@@ -7728,6 +7733,104 @@
                       </a:ext>
                     </a:extLst>
                   </a:tr>
+                  <a:tr h="328754">
+                    <a:tc>
+                      <a:txBody>
+                        <a:bodyPr/>
+                        <a:lstStyle/>
+                        <a:p>
+                          <a:r>
+                            <a:rPr lang="en-US" sz="1600" dirty="0"/>
+                            <a:t>Stiffness [Nm/rad]</a:t>
+                          </a:r>
+                          <a:endParaRPr lang="de-DE" sz="1600" dirty="0"/>
+                        </a:p>
+                      </a:txBody>
+                      <a:tcPr/>
+                    </a:tc>
+                    <a:tc>
+                      <a:txBody>
+                        <a:bodyPr/>
+                        <a:lstStyle/>
+                        <a:p>
+                          <a:r>
+                            <a:rPr lang="en-US" sz="1600" dirty="0"/>
+                            <a:t>100</a:t>
+                          </a:r>
+                          <a:endParaRPr lang="de-DE" sz="1600" dirty="0"/>
+                        </a:p>
+                      </a:txBody>
+                      <a:tcPr/>
+                    </a:tc>
+                    <a:tc>
+                      <a:txBody>
+                        <a:bodyPr/>
+                        <a:lstStyle/>
+                        <a:p>
+                          <a:r>
+                            <a:rPr lang="en-US" sz="1600" dirty="0"/>
+                            <a:t>100</a:t>
+                          </a:r>
+                          <a:endParaRPr lang="de-DE" sz="1600" dirty="0"/>
+                        </a:p>
+                      </a:txBody>
+                      <a:tcPr/>
+                    </a:tc>
+                    <a:extLst>
+                      <a:ext uri="{0D108BD9-81ED-4DB2-BD59-A6C34878D82A}">
+                        <a16:rowId xmlns:a16="http://schemas.microsoft.com/office/drawing/2014/main" val="2700577283"/>
+                      </a:ext>
+                    </a:extLst>
+                  </a:tr>
+                  <a:tr h="328379">
+                    <a:tc>
+                      <a:txBody>
+                        <a:bodyPr/>
+                        <a:lstStyle/>
+                        <a:p>
+                          <a:r>
+                            <a:rPr lang="en-US" sz="1600" dirty="0"/>
+                            <a:t>Damping [Nm/rads]</a:t>
+                          </a:r>
+                          <a:endParaRPr lang="de-DE" sz="1600" dirty="0"/>
+                        </a:p>
+                      </a:txBody>
+                      <a:tcPr/>
+                    </a:tc>
+                    <a:tc>
+                      <a:txBody>
+                        <a:bodyPr/>
+                        <a:lstStyle/>
+                        <a:p>
+                          <a:r>
+                            <a:rPr lang="en-US" sz="1600" dirty="0"/>
+                            <a:t>0.1</a:t>
+                          </a:r>
+                          <a:endParaRPr lang="de-DE" sz="1600" dirty="0"/>
+                        </a:p>
+                      </a:txBody>
+                      <a:tcPr/>
+                    </a:tc>
+                    <a:tc>
+                      <a:txBody>
+                        <a:bodyPr/>
+                        <a:lstStyle/>
+                        <a:p>
+                          <a:r>
+                            <a:rPr lang="en-US" sz="1600" dirty="0"/>
+                            <a:t>0.1</a:t>
+                          </a:r>
+                          <a:endParaRPr lang="de-DE" sz="1600" dirty="0"/>
+                        </a:p>
+                      </a:txBody>
+                      <a:tcPr/>
+                    </a:tc>
+                    <a:extLst>
+                      <a:ext uri="{0D108BD9-81ED-4DB2-BD59-A6C34878D82A}">
+                        <a16:rowId xmlns:a16="http://schemas.microsoft.com/office/drawing/2014/main" val="4244594628"/>
+                      </a:ext>
+                    </a:extLst>
+                  </a:tr>
                 </a:tbl>
               </a:graphicData>
             </a:graphic>
@@ -7749,14 +7852,14 @@
               <p:nvPr>
                 <p:extLst>
                   <p:ext uri="{D42A27DB-BD31-4B8C-83A1-F6EECF244321}">
-                    <p14:modId xmlns:p14="http://schemas.microsoft.com/office/powerpoint/2010/main" val="3480575101"/>
+                    <p14:modId xmlns:p14="http://schemas.microsoft.com/office/powerpoint/2010/main" val="1221710503"/>
                   </p:ext>
                 </p:extLst>
               </p:nvPr>
             </p:nvGraphicFramePr>
             <p:xfrm>
-              <a:off x="5621481" y="3429000"/>
-              <a:ext cx="6471327" cy="3067681"/>
+              <a:off x="5621481" y="3002781"/>
+              <a:ext cx="6471327" cy="3738241"/>
             </p:xfrm>
             <a:graphic>
               <a:graphicData uri="http://schemas.openxmlformats.org/drawingml/2006/table">
@@ -7907,7 +8010,7 @@
                         <a:blipFill>
                           <a:blip r:embed="rId3"/>
                           <a:stretch>
-                            <a:fillRect l="-282" t="-172152" r="-201130" b="-384810"/>
+                            <a:fillRect l="-282" t="-172152" r="-201130" b="-524051"/>
                           </a:stretch>
                         </a:blipFill>
                       </a:tcPr>
@@ -7958,7 +8061,7 @@
                         <a:blipFill>
                           <a:blip r:embed="rId3"/>
                           <a:stretch>
-                            <a:fillRect l="-282" t="-223958" r="-201130" b="-216667"/>
+                            <a:fillRect l="-282" t="-226316" r="-201130" b="-335789"/>
                           </a:stretch>
                         </a:blipFill>
                       </a:tcPr>
@@ -8010,7 +8113,7 @@
                         <a:blipFill>
                           <a:blip r:embed="rId3"/>
                           <a:stretch>
-                            <a:fillRect l="-282" t="-311000" r="-201130" b="-108000"/>
+                            <a:fillRect l="-282" t="-306931" r="-201130" b="-215842"/>
                           </a:stretch>
                         </a:blipFill>
                       </a:tcPr>
@@ -8062,7 +8165,7 @@
                         <a:blipFill>
                           <a:blip r:embed="rId3"/>
                           <a:stretch>
-                            <a:fillRect l="-282" t="-432632" r="-201130" b="-13684"/>
+                            <a:fillRect l="-282" t="-432632" r="-201130" b="-129474"/>
                           </a:stretch>
                         </a:blipFill>
                       </a:tcPr>
@@ -8098,6 +8201,104 @@
                     <a:extLst>
                       <a:ext uri="{0D108BD9-81ED-4DB2-BD59-A6C34878D82A}">
                         <a16:rowId xmlns:a16="http://schemas.microsoft.com/office/drawing/2014/main" val="2487051653"/>
+                      </a:ext>
+                    </a:extLst>
+                  </a:tr>
+                  <a:tr h="335280">
+                    <a:tc>
+                      <a:txBody>
+                        <a:bodyPr/>
+                        <a:lstStyle/>
+                        <a:p>
+                          <a:r>
+                            <a:rPr lang="en-US" sz="1600" dirty="0"/>
+                            <a:t>Stiffness [Nm/rad]</a:t>
+                          </a:r>
+                          <a:endParaRPr lang="de-DE" sz="1600" dirty="0"/>
+                        </a:p>
+                      </a:txBody>
+                      <a:tcPr/>
+                    </a:tc>
+                    <a:tc>
+                      <a:txBody>
+                        <a:bodyPr/>
+                        <a:lstStyle/>
+                        <a:p>
+                          <a:r>
+                            <a:rPr lang="en-US" sz="1600" dirty="0"/>
+                            <a:t>100</a:t>
+                          </a:r>
+                          <a:endParaRPr lang="de-DE" sz="1600" dirty="0"/>
+                        </a:p>
+                      </a:txBody>
+                      <a:tcPr/>
+                    </a:tc>
+                    <a:tc>
+                      <a:txBody>
+                        <a:bodyPr/>
+                        <a:lstStyle/>
+                        <a:p>
+                          <a:r>
+                            <a:rPr lang="en-US" sz="1600" dirty="0"/>
+                            <a:t>100</a:t>
+                          </a:r>
+                          <a:endParaRPr lang="de-DE" sz="1600" dirty="0"/>
+                        </a:p>
+                      </a:txBody>
+                      <a:tcPr/>
+                    </a:tc>
+                    <a:extLst>
+                      <a:ext uri="{0D108BD9-81ED-4DB2-BD59-A6C34878D82A}">
+                        <a16:rowId xmlns:a16="http://schemas.microsoft.com/office/drawing/2014/main" val="2700577283"/>
+                      </a:ext>
+                    </a:extLst>
+                  </a:tr>
+                  <a:tr h="335280">
+                    <a:tc>
+                      <a:txBody>
+                        <a:bodyPr/>
+                        <a:lstStyle/>
+                        <a:p>
+                          <a:r>
+                            <a:rPr lang="en-US" sz="1600" dirty="0"/>
+                            <a:t>Damping [Nm/rads]</a:t>
+                          </a:r>
+                          <a:endParaRPr lang="de-DE" sz="1600" dirty="0"/>
+                        </a:p>
+                      </a:txBody>
+                      <a:tcPr/>
+                    </a:tc>
+                    <a:tc>
+                      <a:txBody>
+                        <a:bodyPr/>
+                        <a:lstStyle/>
+                        <a:p>
+                          <a:r>
+                            <a:rPr lang="en-US" sz="1600" dirty="0"/>
+                            <a:t>0.1</a:t>
+                          </a:r>
+                          <a:endParaRPr lang="de-DE" sz="1600" dirty="0"/>
+                        </a:p>
+                      </a:txBody>
+                      <a:tcPr/>
+                    </a:tc>
+                    <a:tc>
+                      <a:txBody>
+                        <a:bodyPr/>
+                        <a:lstStyle/>
+                        <a:p>
+                          <a:r>
+                            <a:rPr lang="en-US" sz="1600" dirty="0"/>
+                            <a:t>0.1</a:t>
+                          </a:r>
+                          <a:endParaRPr lang="de-DE" sz="1600" dirty="0"/>
+                        </a:p>
+                      </a:txBody>
+                      <a:tcPr/>
+                    </a:tc>
+                    <a:extLst>
+                      <a:ext uri="{0D108BD9-81ED-4DB2-BD59-A6C34878D82A}">
+                        <a16:rowId xmlns:a16="http://schemas.microsoft.com/office/drawing/2014/main" val="4244594628"/>
                       </a:ext>
                     </a:extLst>
                   </a:tr>

</xml_diff>